<commit_message>
Update code and architecture
</commit_message>
<xml_diff>
--- a/docs/high-level-architecture.pptx
+++ b/docs/high-level-architecture.pptx
@@ -3390,8 +3390,8 @@
         </p:nvSpPr>
         <p:spPr>
           <a:xfrm>
-            <a:off x="4278137" y="3214608"/>
-            <a:ext cx="992580" cy="215444"/>
+            <a:off x="4437636" y="3214608"/>
+            <a:ext cx="673582" cy="215444"/>
           </a:xfrm>
           <a:prstGeom prst="rect">
             <a:avLst/>
@@ -3413,7 +3413,11 @@
           <a:p>
             <a:r>
               <a:rPr lang="en-US" dirty="0" smtClean="0"/>
-              <a:t>Mobile App Service</a:t>
+              <a:t>App </a:t>
+            </a:r>
+            <a:r>
+              <a:rPr lang="en-US" dirty="0" smtClean="0"/>
+              <a:t>Service</a:t>
             </a:r>
             <a:endParaRPr lang="en-US" dirty="0"/>
           </a:p>
@@ -3423,7 +3427,6 @@
         <p:nvCxnSpPr>
           <p:cNvPr id="7" name="Elbow Connector 6"/>
           <p:cNvCxnSpPr>
-            <a:stCxn id="2" idx="1"/>
             <a:endCxn id="4" idx="3"/>
           </p:cNvCxnSpPr>
           <p:nvPr/>
@@ -3804,14 +3807,14 @@
           <p:cNvPr id="36" name="Straight Arrow Connector 35"/>
           <p:cNvCxnSpPr>
             <a:stCxn id="23" idx="1"/>
-            <a:endCxn id="2" idx="3"/>
+            <a:endCxn id="27" idx="3"/>
           </p:cNvCxnSpPr>
           <p:nvPr/>
         </p:nvCxnSpPr>
         <p:spPr>
-          <a:xfrm flipH="1">
-            <a:off x="5042211" y="3014812"/>
-            <a:ext cx="2708888" cy="3053"/>
+          <a:xfrm flipH="1" flipV="1">
+            <a:off x="4991028" y="3010825"/>
+            <a:ext cx="2760071" cy="3987"/>
           </a:xfrm>
           <a:prstGeom prst="straightConnector1">
             <a:avLst/>
@@ -3905,15 +3908,15 @@
         <p:nvCxnSpPr>
           <p:cNvPr id="47" name="Elbow Connector 46"/>
           <p:cNvCxnSpPr>
-            <a:stCxn id="2" idx="1"/>
+            <a:stCxn id="27" idx="1"/>
             <a:endCxn id="45" idx="3"/>
           </p:cNvCxnSpPr>
           <p:nvPr/>
         </p:nvCxnSpPr>
         <p:spPr>
           <a:xfrm rot="10800000" flipV="1">
-            <a:off x="2849844" y="3017864"/>
-            <a:ext cx="1680466" cy="402499"/>
+            <a:off x="2849845" y="3010824"/>
+            <a:ext cx="1707979" cy="409539"/>
           </a:xfrm>
           <a:prstGeom prst="bentConnector3">
             <a:avLst>
@@ -4061,14 +4064,14 @@
           <p:cNvPr id="80" name="Elbow Connector 79"/>
           <p:cNvCxnSpPr>
             <a:stCxn id="78" idx="3"/>
-            <a:endCxn id="2" idx="0"/>
+            <a:endCxn id="27" idx="0"/>
           </p:cNvCxnSpPr>
           <p:nvPr/>
         </p:nvCxnSpPr>
         <p:spPr>
           <a:xfrm>
             <a:off x="2785825" y="1842038"/>
-            <a:ext cx="2000436" cy="923431"/>
+            <a:ext cx="1988601" cy="1003988"/>
           </a:xfrm>
           <a:prstGeom prst="bentConnector2">
             <a:avLst/>
@@ -4100,7 +4103,7 @@
       </p:cxnSp>
       <p:pic>
         <p:nvPicPr>
-          <p:cNvPr id="2" name="Picture 1"/>
+          <p:cNvPr id="27" name="Picture 26"/>
           <p:cNvPicPr>
             <a:picLocks noChangeAspect="1"/>
           </p:cNvPicPr>
@@ -4114,8 +4117,8 @@
         </p:blipFill>
         <p:spPr>
           <a:xfrm>
-            <a:off x="4530310" y="2765469"/>
-            <a:ext cx="511901" cy="504791"/>
+            <a:off x="4557823" y="2846026"/>
+            <a:ext cx="433205" cy="329598"/>
           </a:xfrm>
           <a:prstGeom prst="rect">
             <a:avLst/>

</xml_diff>

<commit_message>
Facebook authentication and minor fixes
</commit_message>
<xml_diff>
--- a/docs/high-level-architecture.pptx
+++ b/docs/high-level-architecture.pptx
@@ -198,7 +198,7 @@
           <a:p>
             <a:fld id="{2712D60C-53E1-EB4B-A0D4-1C1DBEDFE290}" type="datetimeFigureOut">
               <a:rPr lang="en-US" smtClean="0"/>
-              <a:t>11/1/17</a:t>
+              <a:t>11/18/17</a:t>
             </a:fld>
             <a:endParaRPr lang="en-US"/>
           </a:p>
@@ -594,7 +594,7 @@
           <a:p>
             <a:fld id="{7A578F14-283A-954B-93B6-F5883A28CC6E}" type="datetimeFigureOut">
               <a:rPr lang="en-US" smtClean="0"/>
-              <a:t>11/1/17</a:t>
+              <a:t>11/18/17</a:t>
             </a:fld>
             <a:endParaRPr lang="en-US"/>
           </a:p>
@@ -762,7 +762,7 @@
           <a:p>
             <a:fld id="{7A578F14-283A-954B-93B6-F5883A28CC6E}" type="datetimeFigureOut">
               <a:rPr lang="en-US" smtClean="0"/>
-              <a:t>11/1/17</a:t>
+              <a:t>11/18/17</a:t>
             </a:fld>
             <a:endParaRPr lang="en-US"/>
           </a:p>
@@ -940,7 +940,7 @@
           <a:p>
             <a:fld id="{7A578F14-283A-954B-93B6-F5883A28CC6E}" type="datetimeFigureOut">
               <a:rPr lang="en-US" smtClean="0"/>
-              <a:t>11/1/17</a:t>
+              <a:t>11/18/17</a:t>
             </a:fld>
             <a:endParaRPr lang="en-US"/>
           </a:p>
@@ -1108,7 +1108,7 @@
           <a:p>
             <a:fld id="{7A578F14-283A-954B-93B6-F5883A28CC6E}" type="datetimeFigureOut">
               <a:rPr lang="en-US" smtClean="0"/>
-              <a:t>11/1/17</a:t>
+              <a:t>11/18/17</a:t>
             </a:fld>
             <a:endParaRPr lang="en-US"/>
           </a:p>
@@ -1353,7 +1353,7 @@
           <a:p>
             <a:fld id="{7A578F14-283A-954B-93B6-F5883A28CC6E}" type="datetimeFigureOut">
               <a:rPr lang="en-US" smtClean="0"/>
-              <a:t>11/1/17</a:t>
+              <a:t>11/18/17</a:t>
             </a:fld>
             <a:endParaRPr lang="en-US"/>
           </a:p>
@@ -1582,7 +1582,7 @@
           <a:p>
             <a:fld id="{7A578F14-283A-954B-93B6-F5883A28CC6E}" type="datetimeFigureOut">
               <a:rPr lang="en-US" smtClean="0"/>
-              <a:t>11/1/17</a:t>
+              <a:t>11/18/17</a:t>
             </a:fld>
             <a:endParaRPr lang="en-US"/>
           </a:p>
@@ -1946,7 +1946,7 @@
           <a:p>
             <a:fld id="{7A578F14-283A-954B-93B6-F5883A28CC6E}" type="datetimeFigureOut">
               <a:rPr lang="en-US" smtClean="0"/>
-              <a:t>11/1/17</a:t>
+              <a:t>11/18/17</a:t>
             </a:fld>
             <a:endParaRPr lang="en-US"/>
           </a:p>
@@ -2063,7 +2063,7 @@
           <a:p>
             <a:fld id="{7A578F14-283A-954B-93B6-F5883A28CC6E}" type="datetimeFigureOut">
               <a:rPr lang="en-US" smtClean="0"/>
-              <a:t>11/1/17</a:t>
+              <a:t>11/18/17</a:t>
             </a:fld>
             <a:endParaRPr lang="en-US"/>
           </a:p>
@@ -2158,7 +2158,7 @@
           <a:p>
             <a:fld id="{7A578F14-283A-954B-93B6-F5883A28CC6E}" type="datetimeFigureOut">
               <a:rPr lang="en-US" smtClean="0"/>
-              <a:t>11/1/17</a:t>
+              <a:t>11/18/17</a:t>
             </a:fld>
             <a:endParaRPr lang="en-US"/>
           </a:p>
@@ -2433,7 +2433,7 @@
           <a:p>
             <a:fld id="{7A578F14-283A-954B-93B6-F5883A28CC6E}" type="datetimeFigureOut">
               <a:rPr lang="en-US" smtClean="0"/>
-              <a:t>11/1/17</a:t>
+              <a:t>11/18/17</a:t>
             </a:fld>
             <a:endParaRPr lang="en-US"/>
           </a:p>
@@ -2685,7 +2685,7 @@
           <a:p>
             <a:fld id="{7A578F14-283A-954B-93B6-F5883A28CC6E}" type="datetimeFigureOut">
               <a:rPr lang="en-US" smtClean="0"/>
-              <a:t>11/1/17</a:t>
+              <a:t>11/18/17</a:t>
             </a:fld>
             <a:endParaRPr lang="en-US"/>
           </a:p>
@@ -2896,7 +2896,7 @@
           <a:p>
             <a:fld id="{7A578F14-283A-954B-93B6-F5883A28CC6E}" type="datetimeFigureOut">
               <a:rPr lang="en-US" smtClean="0"/>
-              <a:t>11/1/17</a:t>
+              <a:t>11/18/17</a:t>
             </a:fld>
             <a:endParaRPr lang="en-US"/>
           </a:p>
@@ -5142,20 +5142,18 @@
           </p:cNvPr>
           <p:cNvCxnSpPr>
             <a:cxnSpLocks/>
-            <a:stCxn id="23" idx="0"/>
+            <a:stCxn id="6" idx="1"/>
             <a:endCxn id="10" idx="0"/>
           </p:cNvCxnSpPr>
           <p:nvPr/>
         </p:nvCxnSpPr>
         <p:spPr>
-          <a:xfrm rot="16200000" flipV="1">
-            <a:off x="5453597" y="1530024"/>
-            <a:ext cx="821720" cy="2473439"/>
-          </a:xfrm>
-          <a:prstGeom prst="bentConnector3">
-            <a:avLst>
-              <a:gd name="adj1" fmla="val 183459"/>
-            </a:avLst>
+          <a:xfrm rot="10800000" flipV="1">
+            <a:off x="4627737" y="1981434"/>
+            <a:ext cx="2233868" cy="374449"/>
+          </a:xfrm>
+          <a:prstGeom prst="bentConnector2">
+            <a:avLst/>
           </a:prstGeom>
           <a:ln w="6350">
             <a:solidFill>
@@ -5196,8 +5194,8 @@
         </p:nvSpPr>
         <p:spPr>
           <a:xfrm>
-            <a:off x="4691860" y="1692277"/>
-            <a:ext cx="684804" cy="215444"/>
+            <a:off x="4627737" y="1757580"/>
+            <a:ext cx="684803" cy="215444"/>
           </a:xfrm>
           <a:prstGeom prst="rect">
             <a:avLst/>
@@ -5459,6 +5457,133 @@
           </a:fontRef>
         </p:style>
       </p:cxnSp>
+      <p:pic>
+        <p:nvPicPr>
+          <p:cNvPr id="6" name="Picture 5">
+            <a:extLst>
+              <a:ext uri="{FF2B5EF4-FFF2-40B4-BE49-F238E27FC236}">
+                <a16:creationId xmlns:a16="http://schemas.microsoft.com/office/drawing/2014/main" id="{E3BBF76C-AE58-744E-8819-0FE6345237D5}"/>
+              </a:ext>
+            </a:extLst>
+          </p:cNvPr>
+          <p:cNvPicPr>
+            <a:picLocks noChangeAspect="1"/>
+          </p:cNvPicPr>
+          <p:nvPr/>
+        </p:nvPicPr>
+        <p:blipFill>
+          <a:blip r:embed="rId10"/>
+          <a:stretch>
+            <a:fillRect/>
+          </a:stretch>
+        </p:blipFill>
+        <p:spPr>
+          <a:xfrm>
+            <a:off x="6861605" y="1790935"/>
+            <a:ext cx="476250" cy="381000"/>
+          </a:xfrm>
+          <a:prstGeom prst="rect">
+            <a:avLst/>
+          </a:prstGeom>
+        </p:spPr>
+      </p:pic>
+      <p:cxnSp>
+        <p:nvCxnSpPr>
+          <p:cNvPr id="40" name="Straight Arrow Connector 39">
+            <a:extLst>
+              <a:ext uri="{FF2B5EF4-FFF2-40B4-BE49-F238E27FC236}">
+                <a16:creationId xmlns:a16="http://schemas.microsoft.com/office/drawing/2014/main" id="{9F9FBADF-A149-7847-ACAF-B6B32B97E58E}"/>
+              </a:ext>
+            </a:extLst>
+          </p:cNvPr>
+          <p:cNvCxnSpPr>
+            <a:cxnSpLocks/>
+            <a:stCxn id="23" idx="0"/>
+            <a:endCxn id="42" idx="2"/>
+          </p:cNvCxnSpPr>
+          <p:nvPr/>
+        </p:nvCxnSpPr>
+        <p:spPr>
+          <a:xfrm flipH="1" flipV="1">
+            <a:off x="7099730" y="2484926"/>
+            <a:ext cx="1446" cy="692678"/>
+          </a:xfrm>
+          <a:prstGeom prst="straightConnector1">
+            <a:avLst/>
+          </a:prstGeom>
+          <a:ln w="6350">
+            <a:solidFill>
+              <a:schemeClr val="bg1">
+                <a:lumMod val="65000"/>
+              </a:schemeClr>
+            </a:solidFill>
+            <a:headEnd type="none" w="med" len="med"/>
+            <a:tailEnd type="triangle"/>
+          </a:ln>
+        </p:spPr>
+        <p:style>
+          <a:lnRef idx="2">
+            <a:schemeClr val="accent1"/>
+          </a:lnRef>
+          <a:fillRef idx="0">
+            <a:schemeClr val="accent1"/>
+          </a:fillRef>
+          <a:effectRef idx="1">
+            <a:schemeClr val="accent1"/>
+          </a:effectRef>
+          <a:fontRef idx="minor">
+            <a:schemeClr val="tx1"/>
+          </a:fontRef>
+        </p:style>
+      </p:cxnSp>
+      <p:sp>
+        <p:nvSpPr>
+          <p:cNvPr id="42" name="TextBox 41">
+            <a:extLst>
+              <a:ext uri="{FF2B5EF4-FFF2-40B4-BE49-F238E27FC236}">
+                <a16:creationId xmlns:a16="http://schemas.microsoft.com/office/drawing/2014/main" id="{DE9C4643-B5F6-0344-8BA9-8BDBF74C5462}"/>
+              </a:ext>
+            </a:extLst>
+          </p:cNvPr>
+          <p:cNvSpPr txBox="1"/>
+          <p:nvPr/>
+        </p:nvSpPr>
+        <p:spPr>
+          <a:xfrm>
+            <a:off x="6694811" y="2146372"/>
+            <a:ext cx="809837" cy="338554"/>
+          </a:xfrm>
+          <a:prstGeom prst="rect">
+            <a:avLst/>
+          </a:prstGeom>
+          <a:noFill/>
+        </p:spPr>
+        <p:txBody>
+          <a:bodyPr wrap="none" rtlCol="0">
+            <a:spAutoFit/>
+          </a:bodyPr>
+          <a:lstStyle>
+            <a:defPPr>
+              <a:defRPr lang="en-US"/>
+            </a:defPPr>
+            <a:lvl1pPr algn="ctr">
+              <a:defRPr sz="800"/>
+            </a:lvl1pPr>
+          </a:lstStyle>
+          <a:p>
+            <a:r>
+              <a:rPr lang="en-US" dirty="0"/>
+              <a:t>Facebook </a:t>
+            </a:r>
+          </a:p>
+          <a:p>
+            <a:r>
+              <a:rPr lang="en-US" dirty="0"/>
+              <a:t>Authentication</a:t>
+            </a:r>
+          </a:p>
+        </p:txBody>
+      </p:sp>
     </p:spTree>
     <p:extLst>
       <p:ext uri="{BB962C8B-B14F-4D97-AF65-F5344CB8AC3E}">

</xml_diff>